<commit_message>
Updates to front end functionality and database
Implemented Completed column in database.  This prevents transactions from appearing on their table in profile when completed and from being deleted by the user.
</commit_message>
<xml_diff>
--- a/Presentations/Caravanserai - Phase 3.pptx
+++ b/Presentations/Caravanserai - Phase 3.pptx
@@ -6467,7 +6467,7 @@
           <a:p>
             <a:r>
               <a:rPr lang="en-US" dirty="0"/>
-              <a:t>What we have Built</a:t>
+              <a:t>What Has been Built</a:t>
             </a:r>
           </a:p>
         </p:txBody>
@@ -6715,7 +6715,15 @@
             </a:pPr>
             <a:r>
               <a:rPr lang="en-US" sz="2400" dirty="0"/>
-              <a:t>Upgraded user IDs into GUIDs</a:t>
+              <a:t>Upgraded user </a:t>
+            </a:r>
+            <a:r>
+              <a:rPr lang="en-US" sz="2400"/>
+              <a:t>and group </a:t>
+            </a:r>
+            <a:r>
+              <a:rPr lang="en-US" sz="2400" dirty="0"/>
+              <a:t>IDs into GUIDs</a:t>
             </a:r>
           </a:p>
           <a:p>
@@ -7284,10 +7292,9 @@
               <a:buChar char="•"/>
             </a:pPr>
             <a:r>
-              <a:rPr lang="en-US" sz="2400"/>
+              <a:rPr lang="en-US" sz="2400" dirty="0"/>
               <a:t>Illness</a:t>
             </a:r>
-            <a:endParaRPr lang="en-US" sz="2400" dirty="0"/>
           </a:p>
           <a:p>
             <a:pPr marL="342900" indent="-342900">

</xml_diff>